<commit_message>
conf plots for ex2
</commit_message>
<xml_diff>
--- a/CVOE/2 Supporting Documents/William Carey CVOE poster.pptx
+++ b/CVOE/2 Supporting Documents/William Carey CVOE poster.pptx
@@ -126,7 +126,7 @@
 <file path=ppt/revisionInfo.xml><?xml version="1.0" encoding="utf-8"?>
 <p1510:revInfo xmlns:a="http://schemas.openxmlformats.org/drawingml/2006/main" xmlns:r="http://schemas.openxmlformats.org/officeDocument/2006/relationships" xmlns:p1510="http://schemas.microsoft.com/office/powerpoint/2015/10/main">
   <p1510:revLst>
-    <p1510:client id="{E756AE67-FFAA-47C5-ABFC-9AFCA3772EA9}" v="146" dt="2019-03-25T23:06:40.198"/>
+    <p1510:client id="{E756AE67-FFAA-47C5-ABFC-9AFCA3772EA9}" v="2759" dt="2019-03-26T00:43:20.080"/>
   </p1510:revLst>
 </p1510:revInfo>
 </file>
@@ -135,13 +135,13 @@
 <pc:chgInfo xmlns:a="http://schemas.openxmlformats.org/drawingml/2006/main" xmlns:r="http://schemas.openxmlformats.org/officeDocument/2006/relationships" xmlns:ac="http://schemas.microsoft.com/office/drawing/2013/main/command" xmlns:pc="http://schemas.microsoft.com/office/powerpoint/2013/main/command">
   <pc:docChgLst>
     <pc:chgData name="Nick Maxwell" userId="8614ede61265de7b" providerId="LiveId" clId="{E756AE67-FFAA-47C5-ABFC-9AFCA3772EA9}"/>
-    <pc:docChg chg="undo redo modSld">
-      <pc:chgData name="Nick Maxwell" userId="8614ede61265de7b" providerId="LiveId" clId="{E756AE67-FFAA-47C5-ABFC-9AFCA3772EA9}" dt="2019-03-25T23:06:40.198" v="150"/>
+    <pc:docChg chg="undo redo custSel modSld">
+      <pc:chgData name="Nick Maxwell" userId="8614ede61265de7b" providerId="LiveId" clId="{E756AE67-FFAA-47C5-ABFC-9AFCA3772EA9}" dt="2019-03-26T00:43:20.080" v="2764" actId="14100"/>
       <pc:docMkLst>
         <pc:docMk/>
       </pc:docMkLst>
       <pc:sldChg chg="addSp delSp modSp">
-        <pc:chgData name="Nick Maxwell" userId="8614ede61265de7b" providerId="LiveId" clId="{E756AE67-FFAA-47C5-ABFC-9AFCA3772EA9}" dt="2019-03-25T23:06:40.198" v="150"/>
+        <pc:chgData name="Nick Maxwell" userId="8614ede61265de7b" providerId="LiveId" clId="{E756AE67-FFAA-47C5-ABFC-9AFCA3772EA9}" dt="2019-03-26T00:43:20.080" v="2764" actId="14100"/>
         <pc:sldMkLst>
           <pc:docMk/>
           <pc:sldMk cId="0" sldId="256"/>
@@ -162,6 +162,14 @@
             <ac:spMk id="3" creationId="{E0C1E3EE-2F1B-4219-BB81-A795A2DA4490}"/>
           </ac:spMkLst>
         </pc:spChg>
+        <pc:spChg chg="del mod">
+          <ac:chgData name="Nick Maxwell" userId="8614ede61265de7b" providerId="LiveId" clId="{E756AE67-FFAA-47C5-ABFC-9AFCA3772EA9}" dt="2019-03-26T00:09:24.425" v="1188"/>
+          <ac:spMkLst>
+            <pc:docMk/>
+            <pc:sldMk cId="0" sldId="256"/>
+            <ac:spMk id="4" creationId="{00000000-0000-0000-0000-000000000000}"/>
+          </ac:spMkLst>
+        </pc:spChg>
         <pc:spChg chg="mod">
           <ac:chgData name="Nick Maxwell" userId="8614ede61265de7b" providerId="LiveId" clId="{E756AE67-FFAA-47C5-ABFC-9AFCA3772EA9}" dt="2019-03-25T21:33:35.855" v="34"/>
           <ac:spMkLst>
@@ -176,6 +184,22 @@
             <pc:docMk/>
             <pc:sldMk cId="0" sldId="256"/>
             <ac:spMk id="6" creationId="{00000000-0000-0000-0000-000000000000}"/>
+          </ac:spMkLst>
+        </pc:spChg>
+        <pc:spChg chg="mod">
+          <ac:chgData name="Nick Maxwell" userId="8614ede61265de7b" providerId="LiveId" clId="{E756AE67-FFAA-47C5-ABFC-9AFCA3772EA9}" dt="2019-03-26T00:28:50.504" v="2731" actId="14100"/>
+          <ac:spMkLst>
+            <pc:docMk/>
+            <pc:sldMk cId="0" sldId="256"/>
+            <ac:spMk id="7" creationId="{00000000-0000-0000-0000-000000000000}"/>
+          </ac:spMkLst>
+        </pc:spChg>
+        <pc:spChg chg="mod">
+          <ac:chgData name="Nick Maxwell" userId="8614ede61265de7b" providerId="LiveId" clId="{E756AE67-FFAA-47C5-ABFC-9AFCA3772EA9}" dt="2019-03-26T00:29:27.075" v="2739" actId="1076"/>
+          <ac:spMkLst>
+            <pc:docMk/>
+            <pc:sldMk cId="0" sldId="256"/>
+            <ac:spMk id="8" creationId="{00000000-0000-0000-0000-000000000000}"/>
           </ac:spMkLst>
         </pc:spChg>
         <pc:spChg chg="add del mod">
@@ -226,6 +250,70 @@
             <ac:spMk id="21" creationId="{00000000-0000-0000-0000-000000000000}"/>
           </ac:spMkLst>
         </pc:spChg>
+        <pc:spChg chg="add mod">
+          <ac:chgData name="Nick Maxwell" userId="8614ede61265de7b" providerId="LiveId" clId="{E756AE67-FFAA-47C5-ABFC-9AFCA3772EA9}" dt="2019-03-26T00:43:15.704" v="2763" actId="14100"/>
+          <ac:spMkLst>
+            <pc:docMk/>
+            <pc:sldMk cId="0" sldId="256"/>
+            <ac:spMk id="25" creationId="{4ADB8060-8F13-4DE7-BE6A-D31B51A625DE}"/>
+          </ac:spMkLst>
+        </pc:spChg>
+        <pc:spChg chg="add mod">
+          <ac:chgData name="Nick Maxwell" userId="8614ede61265de7b" providerId="LiveId" clId="{E756AE67-FFAA-47C5-ABFC-9AFCA3772EA9}" dt="2019-03-26T00:43:20.080" v="2764" actId="14100"/>
+          <ac:spMkLst>
+            <pc:docMk/>
+            <pc:sldMk cId="0" sldId="256"/>
+            <ac:spMk id="26" creationId="{31688B2E-0C83-4880-B20B-350181D36961}"/>
+          </ac:spMkLst>
+        </pc:spChg>
+        <pc:spChg chg="add mod">
+          <ac:chgData name="Nick Maxwell" userId="8614ede61265de7b" providerId="LiveId" clId="{E756AE67-FFAA-47C5-ABFC-9AFCA3772EA9}" dt="2019-03-26T00:11:32.925" v="1241" actId="14100"/>
+          <ac:spMkLst>
+            <pc:docMk/>
+            <pc:sldMk cId="0" sldId="256"/>
+            <ac:spMk id="27" creationId="{19CEE092-E315-45B9-8220-BB09A9EC15D2}"/>
+          </ac:spMkLst>
+        </pc:spChg>
+        <pc:spChg chg="add mod">
+          <ac:chgData name="Nick Maxwell" userId="8614ede61265de7b" providerId="LiveId" clId="{E756AE67-FFAA-47C5-ABFC-9AFCA3772EA9}" dt="2019-03-26T00:11:18.479" v="1240" actId="14100"/>
+          <ac:spMkLst>
+            <pc:docMk/>
+            <pc:sldMk cId="0" sldId="256"/>
+            <ac:spMk id="28" creationId="{35675E1F-69FC-42EF-927B-3301EBB241DD}"/>
+          </ac:spMkLst>
+        </pc:spChg>
+        <pc:spChg chg="add del mod">
+          <ac:chgData name="Nick Maxwell" userId="8614ede61265de7b" providerId="LiveId" clId="{E756AE67-FFAA-47C5-ABFC-9AFCA3772EA9}" dt="2019-03-26T00:12:29.136" v="1346"/>
+          <ac:spMkLst>
+            <pc:docMk/>
+            <pc:sldMk cId="0" sldId="256"/>
+            <ac:spMk id="29" creationId="{24414171-12C8-4AB6-927B-CB630EF0BE00}"/>
+          </ac:spMkLst>
+        </pc:spChg>
+        <pc:spChg chg="add mod">
+          <ac:chgData name="Nick Maxwell" userId="8614ede61265de7b" providerId="LiveId" clId="{E756AE67-FFAA-47C5-ABFC-9AFCA3772EA9}" dt="2019-03-26T00:29:30.957" v="2740" actId="1076"/>
+          <ac:spMkLst>
+            <pc:docMk/>
+            <pc:sldMk cId="0" sldId="256"/>
+            <ac:spMk id="30" creationId="{FBB54662-E99C-4F4F-9862-C322D8A2E5FC}"/>
+          </ac:spMkLst>
+        </pc:spChg>
+        <pc:spChg chg="add mod">
+          <ac:chgData name="Nick Maxwell" userId="8614ede61265de7b" providerId="LiveId" clId="{E756AE67-FFAA-47C5-ABFC-9AFCA3772EA9}" dt="2019-03-26T00:29:39.641" v="2742" actId="1076"/>
+          <ac:spMkLst>
+            <pc:docMk/>
+            <pc:sldMk cId="0" sldId="256"/>
+            <ac:spMk id="32" creationId="{1D7945D4-261F-45C9-812D-C57B5A0B15A5}"/>
+          </ac:spMkLst>
+        </pc:spChg>
+        <pc:spChg chg="add del">
+          <ac:chgData name="Nick Maxwell" userId="8614ede61265de7b" providerId="LiveId" clId="{E756AE67-FFAA-47C5-ABFC-9AFCA3772EA9}" dt="2019-03-26T00:28:00.902" v="2722"/>
+          <ac:spMkLst>
+            <pc:docMk/>
+            <pc:sldMk cId="0" sldId="256"/>
+            <ac:spMk id="34" creationId="{1F2D72E1-3E0C-4AD0-87BB-F006BEBB6FB1}"/>
+          </ac:spMkLst>
+        </pc:spChg>
         <pc:spChg chg="del mod">
           <ac:chgData name="Nick Maxwell" userId="8614ede61265de7b" providerId="LiveId" clId="{E756AE67-FFAA-47C5-ABFC-9AFCA3772EA9}" dt="2019-03-25T23:06:36.041" v="147"/>
           <ac:spMkLst>
@@ -250,12 +338,52 @@
             <ac:spMk id="282" creationId="{00000000-0000-0000-0000-000000000000}"/>
           </ac:spMkLst>
         </pc:spChg>
+        <pc:picChg chg="del">
+          <ac:chgData name="Nick Maxwell" userId="8614ede61265de7b" providerId="LiveId" clId="{E756AE67-FFAA-47C5-ABFC-9AFCA3772EA9}" dt="2019-03-26T00:09:20.341" v="1184" actId="478"/>
+          <ac:picMkLst>
+            <pc:docMk/>
+            <pc:sldMk cId="0" sldId="256"/>
+            <ac:picMk id="31" creationId="{00000000-0000-0000-0000-000000000000}"/>
+          </ac:picMkLst>
+        </pc:picChg>
+        <pc:picChg chg="del">
+          <ac:chgData name="Nick Maxwell" userId="8614ede61265de7b" providerId="LiveId" clId="{E756AE67-FFAA-47C5-ABFC-9AFCA3772EA9}" dt="2019-03-26T00:09:17.839" v="1183" actId="478"/>
+          <ac:picMkLst>
+            <pc:docMk/>
+            <pc:sldMk cId="0" sldId="256"/>
+            <ac:picMk id="33" creationId="{00000000-0000-0000-0000-000000000000}"/>
+          </ac:picMkLst>
+        </pc:picChg>
         <pc:picChg chg="mod">
           <ac:chgData name="Nick Maxwell" userId="8614ede61265de7b" providerId="LiveId" clId="{E756AE67-FFAA-47C5-ABFC-9AFCA3772EA9}" dt="2019-03-25T21:32:04.780" v="20" actId="14100"/>
           <ac:picMkLst>
             <pc:docMk/>
             <pc:sldMk cId="0" sldId="256"/>
             <ac:picMk id="1026" creationId="{00000000-0000-0000-0000-000000000000}"/>
+          </ac:picMkLst>
+        </pc:picChg>
+        <pc:picChg chg="del">
+          <ac:chgData name="Nick Maxwell" userId="8614ede61265de7b" providerId="LiveId" clId="{E756AE67-FFAA-47C5-ABFC-9AFCA3772EA9}" dt="2019-03-26T00:09:26.159" v="1189" actId="478"/>
+          <ac:picMkLst>
+            <pc:docMk/>
+            <pc:sldMk cId="0" sldId="256"/>
+            <ac:picMk id="1027" creationId="{00000000-0000-0000-0000-000000000000}"/>
+          </ac:picMkLst>
+        </pc:picChg>
+        <pc:picChg chg="del">
+          <ac:chgData name="Nick Maxwell" userId="8614ede61265de7b" providerId="LiveId" clId="{E756AE67-FFAA-47C5-ABFC-9AFCA3772EA9}" dt="2019-03-26T00:09:24.424" v="1186" actId="478"/>
+          <ac:picMkLst>
+            <pc:docMk/>
+            <pc:sldMk cId="0" sldId="256"/>
+            <ac:picMk id="1029" creationId="{00000000-0000-0000-0000-000000000000}"/>
+          </ac:picMkLst>
+        </pc:picChg>
+        <pc:picChg chg="del">
+          <ac:chgData name="Nick Maxwell" userId="8614ede61265de7b" providerId="LiveId" clId="{E756AE67-FFAA-47C5-ABFC-9AFCA3772EA9}" dt="2019-03-26T00:09:16.622" v="1182" actId="478"/>
+          <ac:picMkLst>
+            <pc:docMk/>
+            <pc:sldMk cId="0" sldId="256"/>
+            <ac:picMk id="1031" creationId="{00000000-0000-0000-0000-000000000000}"/>
           </ac:picMkLst>
         </pc:picChg>
       </pc:sldChg>
@@ -3293,7 +3421,7 @@
         </p:nvSpPr>
         <p:spPr bwMode="auto">
           <a:xfrm>
-            <a:off x="13563600" y="22326600"/>
+            <a:off x="13597995" y="24875604"/>
             <a:ext cx="11647752" cy="1600200"/>
           </a:xfrm>
           <a:prstGeom prst="rect">
@@ -3685,165 +3813,6 @@
           </a:extLst>
         </p:spPr>
       </p:pic>
-      <p:pic>
-        <p:nvPicPr>
-          <p:cNvPr id="1027" name="Picture 3"/>
-          <p:cNvPicPr>
-            <a:picLocks noChangeAspect="1" noChangeArrowheads="1"/>
-          </p:cNvPicPr>
-          <p:nvPr/>
-        </p:nvPicPr>
-        <p:blipFill>
-          <a:blip r:embed="rId3">
-            <a:extLst>
-              <a:ext uri="{28A0092B-C50C-407E-A947-70E740481C1C}">
-                <a14:useLocalDpi xmlns:a14="http://schemas.microsoft.com/office/drawing/2010/main" val="0"/>
-              </a:ext>
-            </a:extLst>
-          </a:blip>
-          <a:stretch>
-            <a:fillRect/>
-          </a:stretch>
-        </p:blipFill>
-        <p:spPr bwMode="auto">
-          <a:xfrm>
-            <a:off x="25679400" y="30099000"/>
-            <a:ext cx="8305800" cy="7599000"/>
-          </a:xfrm>
-          <a:prstGeom prst="rect">
-            <a:avLst/>
-          </a:prstGeom>
-          <a:noFill/>
-          <a:ln>
-            <a:noFill/>
-          </a:ln>
-          <a:extLst>
-            <a:ext uri="{909E8E84-426E-40DD-AFC4-6F175D3DCCD1}">
-              <a14:hiddenFill xmlns:a14="http://schemas.microsoft.com/office/drawing/2010/main">
-                <a:solidFill>
-                  <a:schemeClr val="accent1"/>
-                </a:solidFill>
-              </a14:hiddenFill>
-            </a:ext>
-            <a:ext uri="{91240B29-F687-4F45-9708-019B960494DF}">
-              <a14:hiddenLine xmlns:a14="http://schemas.microsoft.com/office/drawing/2010/main" w="9525">
-                <a:solidFill>
-                  <a:schemeClr val="tx1"/>
-                </a:solidFill>
-                <a:miter lim="800000"/>
-                <a:headEnd/>
-                <a:tailEnd/>
-              </a14:hiddenLine>
-            </a:ext>
-          </a:extLst>
-        </p:spPr>
-      </p:pic>
-      <p:pic>
-        <p:nvPicPr>
-          <p:cNvPr id="1029" name="Picture 5"/>
-          <p:cNvPicPr>
-            <a:picLocks noChangeAspect="1" noChangeArrowheads="1"/>
-          </p:cNvPicPr>
-          <p:nvPr/>
-        </p:nvPicPr>
-        <p:blipFill>
-          <a:blip r:embed="rId4">
-            <a:extLst>
-              <a:ext uri="{28A0092B-C50C-407E-A947-70E740481C1C}">
-                <a14:useLocalDpi xmlns:a14="http://schemas.microsoft.com/office/drawing/2010/main" val="0"/>
-              </a:ext>
-            </a:extLst>
-          </a:blip>
-          <a:stretch>
-            <a:fillRect/>
-          </a:stretch>
-        </p:blipFill>
-        <p:spPr bwMode="auto">
-          <a:xfrm>
-            <a:off x="25679400" y="21259800"/>
-            <a:ext cx="8067187" cy="8153400"/>
-          </a:xfrm>
-          <a:prstGeom prst="rect">
-            <a:avLst/>
-          </a:prstGeom>
-          <a:noFill/>
-          <a:ln>
-            <a:noFill/>
-          </a:ln>
-          <a:extLst>
-            <a:ext uri="{909E8E84-426E-40DD-AFC4-6F175D3DCCD1}">
-              <a14:hiddenFill xmlns:a14="http://schemas.microsoft.com/office/drawing/2010/main">
-                <a:solidFill>
-                  <a:schemeClr val="accent1"/>
-                </a:solidFill>
-              </a14:hiddenFill>
-            </a:ext>
-            <a:ext uri="{91240B29-F687-4F45-9708-019B960494DF}">
-              <a14:hiddenLine xmlns:a14="http://schemas.microsoft.com/office/drawing/2010/main" w="9525">
-                <a:solidFill>
-                  <a:schemeClr val="tx1"/>
-                </a:solidFill>
-                <a:miter lim="800000"/>
-                <a:headEnd/>
-                <a:tailEnd/>
-              </a14:hiddenLine>
-            </a:ext>
-          </a:extLst>
-        </p:spPr>
-      </p:pic>
-      <p:pic>
-        <p:nvPicPr>
-          <p:cNvPr id="1031" name="Picture 7"/>
-          <p:cNvPicPr>
-            <a:picLocks noChangeAspect="1" noChangeArrowheads="1"/>
-          </p:cNvPicPr>
-          <p:nvPr/>
-        </p:nvPicPr>
-        <p:blipFill>
-          <a:blip r:embed="rId5">
-            <a:extLst>
-              <a:ext uri="{28A0092B-C50C-407E-A947-70E740481C1C}">
-                <a14:useLocalDpi xmlns:a14="http://schemas.microsoft.com/office/drawing/2010/main" val="0"/>
-              </a:ext>
-            </a:extLst>
-          </a:blip>
-          <a:stretch>
-            <a:fillRect/>
-          </a:stretch>
-        </p:blipFill>
-        <p:spPr bwMode="auto">
-          <a:xfrm>
-            <a:off x="13563600" y="24079200"/>
-            <a:ext cx="7010400" cy="6934200"/>
-          </a:xfrm>
-          <a:prstGeom prst="rect">
-            <a:avLst/>
-          </a:prstGeom>
-          <a:noFill/>
-          <a:ln>
-            <a:noFill/>
-          </a:ln>
-          <a:extLst>
-            <a:ext uri="{909E8E84-426E-40DD-AFC4-6F175D3DCCD1}">
-              <a14:hiddenFill xmlns:a14="http://schemas.microsoft.com/office/drawing/2010/main">
-                <a:solidFill>
-                  <a:schemeClr val="accent1"/>
-                </a:solidFill>
-              </a14:hiddenFill>
-            </a:ext>
-            <a:ext uri="{91240B29-F687-4F45-9708-019B960494DF}">
-              <a14:hiddenLine xmlns:a14="http://schemas.microsoft.com/office/drawing/2010/main" w="9525">
-                <a:solidFill>
-                  <a:schemeClr val="tx1"/>
-                </a:solidFill>
-                <a:miter lim="800000"/>
-                <a:headEnd/>
-                <a:tailEnd/>
-              </a14:hiddenLine>
-            </a:ext>
-          </a:extLst>
-        </p:spPr>
-      </p:pic>
       <p:sp>
         <p:nvSpPr>
           <p:cNvPr id="44" name="Text Box 3504"/>
@@ -3948,153 +3917,6 @@
           </a:p>
         </p:txBody>
       </p:sp>
-      <p:pic>
-        <p:nvPicPr>
-          <p:cNvPr id="31" name="Picture 5"/>
-          <p:cNvPicPr>
-            <a:picLocks noChangeAspect="1" noChangeArrowheads="1"/>
-          </p:cNvPicPr>
-          <p:nvPr/>
-        </p:nvPicPr>
-        <p:blipFill>
-          <a:blip r:embed="rId6">
-            <a:extLst>
-              <a:ext uri="{28A0092B-C50C-407E-A947-70E740481C1C}">
-                <a14:useLocalDpi xmlns:a14="http://schemas.microsoft.com/office/drawing/2010/main" val="0"/>
-              </a:ext>
-            </a:extLst>
-          </a:blip>
-          <a:stretch>
-            <a:fillRect/>
-          </a:stretch>
-        </p:blipFill>
-        <p:spPr bwMode="auto">
-          <a:xfrm>
-            <a:off x="25984200" y="10820400"/>
-            <a:ext cx="12344400" cy="8229600"/>
-          </a:xfrm>
-          <a:prstGeom prst="rect">
-            <a:avLst/>
-          </a:prstGeom>
-          <a:noFill/>
-          <a:ln>
-            <a:noFill/>
-          </a:ln>
-          <a:extLst>
-            <a:ext uri="{909E8E84-426E-40DD-AFC4-6F175D3DCCD1}">
-              <a14:hiddenFill xmlns:a14="http://schemas.microsoft.com/office/drawing/2010/main">
-                <a:solidFill>
-                  <a:schemeClr val="accent1"/>
-                </a:solidFill>
-              </a14:hiddenFill>
-            </a:ext>
-            <a:ext uri="{91240B29-F687-4F45-9708-019B960494DF}">
-              <a14:hiddenLine xmlns:a14="http://schemas.microsoft.com/office/drawing/2010/main" w="9525">
-                <a:solidFill>
-                  <a:schemeClr val="tx1"/>
-                </a:solidFill>
-                <a:miter lim="800000"/>
-                <a:headEnd/>
-                <a:tailEnd/>
-              </a14:hiddenLine>
-            </a:ext>
-          </a:extLst>
-        </p:spPr>
-      </p:pic>
-      <p:sp>
-        <p:nvSpPr>
-          <p:cNvPr id="4" name="TextBox 3"/>
-          <p:cNvSpPr txBox="1"/>
-          <p:nvPr/>
-        </p:nvSpPr>
-        <p:spPr>
-          <a:xfrm>
-            <a:off x="27736800" y="18897600"/>
-            <a:ext cx="9525000" cy="2308324"/>
-          </a:xfrm>
-          <a:prstGeom prst="rect">
-            <a:avLst/>
-          </a:prstGeom>
-          <a:noFill/>
-        </p:spPr>
-        <p:txBody>
-          <a:bodyPr wrap="square" rtlCol="0">
-            <a:spAutoFit/>
-          </a:bodyPr>
-          <a:lstStyle/>
-          <a:p>
-            <a:r>
-              <a:rPr lang="en-US" sz="2400" b="1" dirty="0"/>
-              <a:t>Fig. 2</a:t>
-            </a:r>
-            <a:r>
-              <a:rPr lang="en-US" sz="2400" dirty="0"/>
-              <a:t>: </a:t>
-            </a:r>
-            <a:r>
-              <a:rPr lang="en-US" sz="2400" dirty="0" err="1"/>
-              <a:t>bbbbbbbbbbbbbbbbbbbbbbbbbbbbbbbbb</a:t>
-            </a:r>
-            <a:r>
-              <a:rPr lang="en-US" sz="2400" dirty="0"/>
-              <a:t> bbbbbbbbbbbbbbbbbbbbbbbbbbbbbbbbbbbbbbbbbbbbbbbbbbbbbbbbbbbbbbbbbbbbbbbbbbbbbbbbbbbbbbbbbbbbbbbbbbbbbbbbbbbbbbbbbbbbbbbbbbbbbbbbbbbbbbbbbbbbbbbbbbbbbbbbbbbbbbbbbbbbbbbbbbbbbbbbbbbbbbbbbbbbbbbbbbbbbbbbbbbbbbbbbbbbbbbbbbbbbbbbbbbbbbbbbbbbbbbbbbbbbbbbbbbbbbbbbbbbbbbbbbbbbbbbbbbbbbbbbbbbbbbb</a:t>
-            </a:r>
-          </a:p>
-        </p:txBody>
-      </p:sp>
-      <p:pic>
-        <p:nvPicPr>
-          <p:cNvPr id="33" name="Picture 7"/>
-          <p:cNvPicPr>
-            <a:picLocks noChangeAspect="1" noChangeArrowheads="1"/>
-          </p:cNvPicPr>
-          <p:nvPr/>
-        </p:nvPicPr>
-        <p:blipFill>
-          <a:blip r:embed="rId7">
-            <a:extLst>
-              <a:ext uri="{28A0092B-C50C-407E-A947-70E740481C1C}">
-                <a14:useLocalDpi xmlns:a14="http://schemas.microsoft.com/office/drawing/2010/main" val="0"/>
-              </a:ext>
-            </a:extLst>
-          </a:blip>
-          <a:stretch>
-            <a:fillRect/>
-          </a:stretch>
-        </p:blipFill>
-        <p:spPr bwMode="auto">
-          <a:xfrm>
-            <a:off x="13792200" y="30632400"/>
-            <a:ext cx="6737775" cy="6934200"/>
-          </a:xfrm>
-          <a:prstGeom prst="rect">
-            <a:avLst/>
-          </a:prstGeom>
-          <a:noFill/>
-          <a:ln>
-            <a:noFill/>
-          </a:ln>
-          <a:extLst>
-            <a:ext uri="{909E8E84-426E-40DD-AFC4-6F175D3DCCD1}">
-              <a14:hiddenFill xmlns:a14="http://schemas.microsoft.com/office/drawing/2010/main">
-                <a:solidFill>
-                  <a:schemeClr val="accent1"/>
-                </a:solidFill>
-              </a14:hiddenFill>
-            </a:ext>
-            <a:ext uri="{91240B29-F687-4F45-9708-019B960494DF}">
-              <a14:hiddenLine xmlns:a14="http://schemas.microsoft.com/office/drawing/2010/main" w="9525">
-                <a:solidFill>
-                  <a:schemeClr val="tx1"/>
-                </a:solidFill>
-                <a:miter lim="800000"/>
-                <a:headEnd/>
-                <a:tailEnd/>
-              </a14:hiddenLine>
-            </a:ext>
-          </a:extLst>
-        </p:spPr>
-      </p:pic>
       <p:sp>
         <p:nvSpPr>
           <p:cNvPr id="11" name="TextBox 10"/>
@@ -4234,6 +4056,358 @@
               </a:rPr>
               <a:t>William Carey University – Master of Biomedical Science</a:t>
             </a:r>
+          </a:p>
+        </p:txBody>
+      </p:sp>
+      <p:sp>
+        <p:nvSpPr>
+          <p:cNvPr id="25" name="Text Box 3506">
+            <a:extLst>
+              <a:ext uri="{FF2B5EF4-FFF2-40B4-BE49-F238E27FC236}">
+                <a16:creationId xmlns:a16="http://schemas.microsoft.com/office/drawing/2014/main" id="{4ADB8060-8F13-4DE7-BE6A-D31B51A625DE}"/>
+              </a:ext>
+            </a:extLst>
+          </p:cNvPr>
+          <p:cNvSpPr txBox="1">
+            <a:spLocks noChangeArrowheads="1"/>
+          </p:cNvSpPr>
+          <p:nvPr/>
+        </p:nvSpPr>
+        <p:spPr bwMode="auto">
+          <a:xfrm>
+            <a:off x="13710511" y="10617482"/>
+            <a:ext cx="11647752" cy="8573459"/>
+          </a:xfrm>
+          <a:prstGeom prst="rect">
+            <a:avLst/>
+          </a:prstGeom>
+          <a:noFill/>
+          <a:ln w="9525" algn="ctr">
+            <a:noFill/>
+            <a:miter lim="800000"/>
+            <a:headEnd/>
+            <a:tailEnd/>
+          </a:ln>
+          <a:effectLst/>
+        </p:spPr>
+        <p:txBody>
+          <a:bodyPr wrap="square" lIns="199977" tIns="99992" rIns="199977" bIns="99992">
+            <a:spAutoFit/>
+          </a:bodyPr>
+          <a:lstStyle/>
+          <a:p>
+            <a:pPr algn="ctr"/>
+            <a:r>
+              <a:rPr lang="en-US" sz="3200" b="1" dirty="0"/>
+              <a:t>Experiment 1</a:t>
+            </a:r>
+          </a:p>
+          <a:p>
+            <a:r>
+              <a:rPr lang="en-US" sz="3200" b="1" i="1" dirty="0"/>
+              <a:t>Participants</a:t>
+            </a:r>
+            <a:r>
+              <a:rPr lang="en-US" sz="3200" b="1" dirty="0"/>
+              <a:t> </a:t>
+            </a:r>
+            <a:r>
+              <a:rPr lang="en-US" sz="3200" dirty="0"/>
+              <a:t>XX undergraduate students were recruited from the University of Southern Mississippi psychology research subject pool.</a:t>
+            </a:r>
+          </a:p>
+          <a:p>
+            <a:endParaRPr lang="en-US" sz="3200" dirty="0"/>
+          </a:p>
+          <a:p>
+            <a:r>
+              <a:rPr lang="en-US" sz="3200" b="1" i="1" dirty="0"/>
+              <a:t>Material  </a:t>
+            </a:r>
+            <a:r>
+              <a:rPr lang="en-US" sz="3200" dirty="0"/>
+              <a:t>Combinations of letters and numbers were used as stimuli (e.g., A 15). Following the design of Huff et al. (2013), these pairs by randomly pairing letters (A, D, E, H, I, J, O, P, S, or U) with numbers randomly selected from 1 and 99. Pairs were selected so that half contained odd numbers.</a:t>
+            </a:r>
+          </a:p>
+          <a:p>
+            <a:endParaRPr lang="en-US" sz="3200" b="1" i="1" dirty="0"/>
+          </a:p>
+          <a:p>
+            <a:r>
+              <a:rPr lang="en-US" sz="3200" b="1" i="1" dirty="0"/>
+              <a:t>Procedure </a:t>
+            </a:r>
+            <a:r>
+              <a:rPr lang="en-US" sz="3200" dirty="0"/>
+              <a:t>Participants completed four sets of trials. The first two blocks always contained pure trials in which subjects either completed the CV or OE task. The final two blocks were switch blocks in which subjects completed both tasks, either in an alternating runs sequence (e.g., CV, CV, OE, OE, CV, CV) or in a randomized sequence (e.g., CV, OE, OE, OE, CV, OE). Each pure block contained 96 trials, while each switch block contained 120 trials. </a:t>
+            </a:r>
+            <a:endParaRPr lang="en-US" sz="3200" b="1" i="1" dirty="0"/>
+          </a:p>
+        </p:txBody>
+      </p:sp>
+      <p:sp>
+        <p:nvSpPr>
+          <p:cNvPr id="26" name="Text Box 3506">
+            <a:extLst>
+              <a:ext uri="{FF2B5EF4-FFF2-40B4-BE49-F238E27FC236}">
+                <a16:creationId xmlns:a16="http://schemas.microsoft.com/office/drawing/2014/main" id="{31688B2E-0C83-4880-B20B-350181D36961}"/>
+              </a:ext>
+            </a:extLst>
+          </p:cNvPr>
+          <p:cNvSpPr txBox="1">
+            <a:spLocks noChangeArrowheads="1"/>
+          </p:cNvSpPr>
+          <p:nvPr/>
+        </p:nvSpPr>
+        <p:spPr bwMode="auto">
+          <a:xfrm>
+            <a:off x="13710511" y="19280181"/>
+            <a:ext cx="11647752" cy="5126362"/>
+          </a:xfrm>
+          <a:prstGeom prst="rect">
+            <a:avLst/>
+          </a:prstGeom>
+          <a:noFill/>
+          <a:ln w="9525" algn="ctr">
+            <a:noFill/>
+            <a:miter lim="800000"/>
+            <a:headEnd/>
+            <a:tailEnd/>
+          </a:ln>
+          <a:effectLst/>
+        </p:spPr>
+        <p:txBody>
+          <a:bodyPr wrap="square" lIns="199977" tIns="99992" rIns="199977" bIns="99992">
+            <a:spAutoFit/>
+          </a:bodyPr>
+          <a:lstStyle/>
+          <a:p>
+            <a:pPr algn="ctr"/>
+            <a:r>
+              <a:rPr lang="en-US" sz="3200" b="1" dirty="0"/>
+              <a:t>Experiment 2</a:t>
+            </a:r>
+          </a:p>
+          <a:p>
+            <a:r>
+              <a:rPr lang="en-US" sz="3200" b="1" i="1" dirty="0"/>
+              <a:t>Participants</a:t>
+            </a:r>
+            <a:r>
+              <a:rPr lang="en-US" sz="3200" b="1" dirty="0"/>
+              <a:t> </a:t>
+            </a:r>
+            <a:r>
+              <a:rPr lang="en-US" sz="3200" dirty="0"/>
+              <a:t>XX adults were recruited from The Hattiesburg Clinic Memory Center. Subjects were classified as being either healthy older adults or as being diagnosed with Alzheimer’s. Patients with an Alzheimer’s diagnosis were classified as CDR 0 on the XX scale, meaning… [CITE]. Overall, XX subjects were classified as healthy and XX were classified as having Alzheimer's.</a:t>
+            </a:r>
+          </a:p>
+          <a:p>
+            <a:endParaRPr lang="en-US" sz="3200" dirty="0"/>
+          </a:p>
+          <a:p>
+            <a:r>
+              <a:rPr lang="en-US" sz="3200" b="1" i="1" dirty="0"/>
+              <a:t>Material and Procedure </a:t>
+            </a:r>
+            <a:r>
+              <a:rPr lang="en-US" sz="3200" dirty="0"/>
+              <a:t>The same stimuli and general procedure from Experiment 1 was used in Experiment 2.</a:t>
+            </a:r>
+            <a:endParaRPr lang="en-US" sz="3200" b="1" i="1" dirty="0"/>
+          </a:p>
+        </p:txBody>
+      </p:sp>
+      <p:sp>
+        <p:nvSpPr>
+          <p:cNvPr id="27" name="Text Box 3506">
+            <a:extLst>
+              <a:ext uri="{FF2B5EF4-FFF2-40B4-BE49-F238E27FC236}">
+                <a16:creationId xmlns:a16="http://schemas.microsoft.com/office/drawing/2014/main" id="{19CEE092-E315-45B9-8220-BB09A9EC15D2}"/>
+              </a:ext>
+            </a:extLst>
+          </p:cNvPr>
+          <p:cNvSpPr txBox="1">
+            <a:spLocks noChangeArrowheads="1"/>
+          </p:cNvSpPr>
+          <p:nvPr/>
+        </p:nvSpPr>
+        <p:spPr bwMode="auto">
+          <a:xfrm>
+            <a:off x="1477108" y="24866199"/>
+            <a:ext cx="10680406" cy="1556154"/>
+          </a:xfrm>
+          <a:prstGeom prst="rect">
+            <a:avLst/>
+          </a:prstGeom>
+          <a:noFill/>
+          <a:ln w="9525" algn="ctr">
+            <a:noFill/>
+            <a:miter lim="800000"/>
+            <a:headEnd/>
+            <a:tailEnd/>
+          </a:ln>
+          <a:effectLst/>
+        </p:spPr>
+        <p:txBody>
+          <a:bodyPr wrap="square" lIns="199977" tIns="99992" rIns="199977" bIns="99992">
+            <a:spAutoFit/>
+          </a:bodyPr>
+          <a:lstStyle/>
+          <a:p>
+            <a:r>
+              <a:rPr lang="en-US" sz="3200" dirty="0"/>
+              <a:t>Background research here. We can use the Huff et al. Article as a resource for this section</a:t>
+            </a:r>
+          </a:p>
+          <a:p>
+            <a:endParaRPr lang="en-US" sz="2400" dirty="0"/>
+          </a:p>
+        </p:txBody>
+      </p:sp>
+      <p:sp>
+        <p:nvSpPr>
+          <p:cNvPr id="28" name="Text Box 3506">
+            <a:extLst>
+              <a:ext uri="{FF2B5EF4-FFF2-40B4-BE49-F238E27FC236}">
+                <a16:creationId xmlns:a16="http://schemas.microsoft.com/office/drawing/2014/main" id="{35675E1F-69FC-42EF-927B-3301EBB241DD}"/>
+              </a:ext>
+            </a:extLst>
+          </p:cNvPr>
+          <p:cNvSpPr txBox="1">
+            <a:spLocks noChangeArrowheads="1"/>
+          </p:cNvSpPr>
+          <p:nvPr/>
+        </p:nvSpPr>
+        <p:spPr bwMode="auto">
+          <a:xfrm>
+            <a:off x="26593603" y="10896600"/>
+            <a:ext cx="11647752" cy="1679264"/>
+          </a:xfrm>
+          <a:prstGeom prst="rect">
+            <a:avLst/>
+          </a:prstGeom>
+          <a:noFill/>
+          <a:ln w="9525" algn="ctr">
+            <a:noFill/>
+            <a:miter lim="800000"/>
+            <a:headEnd/>
+            <a:tailEnd/>
+          </a:ln>
+          <a:effectLst/>
+        </p:spPr>
+        <p:txBody>
+          <a:bodyPr wrap="square" lIns="199977" tIns="99992" rIns="199977" bIns="99992">
+            <a:spAutoFit/>
+          </a:bodyPr>
+          <a:lstStyle/>
+          <a:p>
+            <a:r>
+              <a:rPr lang="en-US" sz="3200" dirty="0"/>
+              <a:t>Figures can go over here</a:t>
+            </a:r>
+          </a:p>
+          <a:p>
+            <a:endParaRPr lang="en-US" sz="3200" dirty="0"/>
+          </a:p>
+          <a:p>
+            <a:endParaRPr lang="en-US" sz="3200" dirty="0"/>
+          </a:p>
+        </p:txBody>
+      </p:sp>
+      <p:sp>
+        <p:nvSpPr>
+          <p:cNvPr id="30" name="Text Box 3506">
+            <a:extLst>
+              <a:ext uri="{FF2B5EF4-FFF2-40B4-BE49-F238E27FC236}">
+                <a16:creationId xmlns:a16="http://schemas.microsoft.com/office/drawing/2014/main" id="{FBB54662-E99C-4F4F-9862-C322D8A2E5FC}"/>
+              </a:ext>
+            </a:extLst>
+          </p:cNvPr>
+          <p:cNvSpPr txBox="1">
+            <a:spLocks noChangeArrowheads="1"/>
+          </p:cNvSpPr>
+          <p:nvPr/>
+        </p:nvSpPr>
+        <p:spPr bwMode="auto">
+          <a:xfrm>
+            <a:off x="13386879" y="26760862"/>
+            <a:ext cx="11647752" cy="1186822"/>
+          </a:xfrm>
+          <a:prstGeom prst="rect">
+            <a:avLst/>
+          </a:prstGeom>
+          <a:noFill/>
+          <a:ln w="9525" algn="ctr">
+            <a:noFill/>
+            <a:miter lim="800000"/>
+            <a:headEnd/>
+            <a:tailEnd/>
+          </a:ln>
+          <a:effectLst/>
+        </p:spPr>
+        <p:txBody>
+          <a:bodyPr wrap="square" lIns="199977" tIns="99992" rIns="199977" bIns="99992">
+            <a:spAutoFit/>
+          </a:bodyPr>
+          <a:lstStyle/>
+          <a:p>
+            <a:pPr algn="ctr"/>
+            <a:r>
+              <a:rPr lang="en-US" sz="3200" b="1" dirty="0"/>
+              <a:t>Experiment 1</a:t>
+            </a:r>
+          </a:p>
+          <a:p>
+            <a:endParaRPr lang="en-US" sz="3200" b="1" i="1" dirty="0"/>
+          </a:p>
+        </p:txBody>
+      </p:sp>
+      <p:sp>
+        <p:nvSpPr>
+          <p:cNvPr id="32" name="Text Box 3506">
+            <a:extLst>
+              <a:ext uri="{FF2B5EF4-FFF2-40B4-BE49-F238E27FC236}">
+                <a16:creationId xmlns:a16="http://schemas.microsoft.com/office/drawing/2014/main" id="{1D7945D4-261F-45C9-812D-C57B5A0B15A5}"/>
+              </a:ext>
+            </a:extLst>
+          </p:cNvPr>
+          <p:cNvSpPr txBox="1">
+            <a:spLocks noChangeArrowheads="1"/>
+          </p:cNvSpPr>
+          <p:nvPr/>
+        </p:nvSpPr>
+        <p:spPr bwMode="auto">
+          <a:xfrm>
+            <a:off x="13597995" y="31724375"/>
+            <a:ext cx="11647752" cy="1186822"/>
+          </a:xfrm>
+          <a:prstGeom prst="rect">
+            <a:avLst/>
+          </a:prstGeom>
+          <a:noFill/>
+          <a:ln w="9525" algn="ctr">
+            <a:noFill/>
+            <a:miter lim="800000"/>
+            <a:headEnd/>
+            <a:tailEnd/>
+          </a:ln>
+          <a:effectLst/>
+        </p:spPr>
+        <p:txBody>
+          <a:bodyPr wrap="square" lIns="199977" tIns="99992" rIns="199977" bIns="99992">
+            <a:spAutoFit/>
+          </a:bodyPr>
+          <a:lstStyle/>
+          <a:p>
+            <a:pPr algn="ctr"/>
+            <a:r>
+              <a:rPr lang="en-US" sz="3200" b="1" dirty="0"/>
+              <a:t>Experiment 2</a:t>
+            </a:r>
+          </a:p>
+          <a:p>
+            <a:endParaRPr lang="en-US" sz="3200" b="1" i="1" dirty="0"/>
           </a:p>
         </p:txBody>
       </p:sp>

</xml_diff>

<commit_message>
update CVOE consent form
</commit_message>
<xml_diff>
--- a/CVOE/2 Supporting Documents/William Carey CVOE poster.pptx
+++ b/CVOE/2 Supporting Documents/William Carey CVOE poster.pptx
@@ -126,7 +126,7 @@
 <file path=ppt/revisionInfo.xml><?xml version="1.0" encoding="utf-8"?>
 <p1510:revInfo xmlns:a="http://schemas.openxmlformats.org/drawingml/2006/main" xmlns:r="http://schemas.openxmlformats.org/officeDocument/2006/relationships" xmlns:p1510="http://schemas.microsoft.com/office/powerpoint/2015/10/main">
   <p1510:revLst>
-    <p1510:client id="{E756AE67-FFAA-47C5-ABFC-9AFCA3772EA9}" v="2759" dt="2019-03-26T00:43:20.080"/>
+    <p1510:client id="{E756AE67-FFAA-47C5-ABFC-9AFCA3772EA9}" v="2771" dt="2019-03-29T15:20:57.193"/>
   </p1510:revLst>
 </p1510:revInfo>
 </file>
@@ -136,12 +136,12 @@
   <pc:docChgLst>
     <pc:chgData name="Nick Maxwell" userId="8614ede61265de7b" providerId="LiveId" clId="{E756AE67-FFAA-47C5-ABFC-9AFCA3772EA9}"/>
     <pc:docChg chg="undo redo custSel modSld">
-      <pc:chgData name="Nick Maxwell" userId="8614ede61265de7b" providerId="LiveId" clId="{E756AE67-FFAA-47C5-ABFC-9AFCA3772EA9}" dt="2019-03-26T00:43:20.080" v="2764" actId="14100"/>
+      <pc:chgData name="Nick Maxwell" userId="8614ede61265de7b" providerId="LiveId" clId="{E756AE67-FFAA-47C5-ABFC-9AFCA3772EA9}" dt="2019-03-29T15:20:57.193" v="2778" actId="1076"/>
       <pc:docMkLst>
         <pc:docMk/>
       </pc:docMkLst>
       <pc:sldChg chg="addSp delSp modSp">
-        <pc:chgData name="Nick Maxwell" userId="8614ede61265de7b" providerId="LiveId" clId="{E756AE67-FFAA-47C5-ABFC-9AFCA3772EA9}" dt="2019-03-26T00:43:20.080" v="2764" actId="14100"/>
+        <pc:chgData name="Nick Maxwell" userId="8614ede61265de7b" providerId="LiveId" clId="{E756AE67-FFAA-47C5-ABFC-9AFCA3772EA9}" dt="2019-03-29T15:20:57.193" v="2778" actId="1076"/>
         <pc:sldMkLst>
           <pc:docMk/>
           <pc:sldMk cId="0" sldId="256"/>
@@ -195,7 +195,7 @@
           </ac:spMkLst>
         </pc:spChg>
         <pc:spChg chg="mod">
-          <ac:chgData name="Nick Maxwell" userId="8614ede61265de7b" providerId="LiveId" clId="{E756AE67-FFAA-47C5-ABFC-9AFCA3772EA9}" dt="2019-03-26T00:29:27.075" v="2739" actId="1076"/>
+          <ac:chgData name="Nick Maxwell" userId="8614ede61265de7b" providerId="LiveId" clId="{E756AE67-FFAA-47C5-ABFC-9AFCA3772EA9}" dt="2019-03-29T15:20:57.193" v="2778" actId="1076"/>
           <ac:spMkLst>
             <pc:docMk/>
             <pc:sldMk cId="0" sldId="256"/>
@@ -251,15 +251,15 @@
           </ac:spMkLst>
         </pc:spChg>
         <pc:spChg chg="add mod">
-          <ac:chgData name="Nick Maxwell" userId="8614ede61265de7b" providerId="LiveId" clId="{E756AE67-FFAA-47C5-ABFC-9AFCA3772EA9}" dt="2019-03-26T00:43:15.704" v="2763" actId="14100"/>
+          <ac:chgData name="Nick Maxwell" userId="8614ede61265de7b" providerId="LiveId" clId="{E756AE67-FFAA-47C5-ABFC-9AFCA3772EA9}" dt="2019-03-29T15:20:40.929" v="2777" actId="20577"/>
           <ac:spMkLst>
             <pc:docMk/>
             <pc:sldMk cId="0" sldId="256"/>
             <ac:spMk id="25" creationId="{4ADB8060-8F13-4DE7-BE6A-D31B51A625DE}"/>
           </ac:spMkLst>
         </pc:spChg>
-        <pc:spChg chg="add mod">
-          <ac:chgData name="Nick Maxwell" userId="8614ede61265de7b" providerId="LiveId" clId="{E756AE67-FFAA-47C5-ABFC-9AFCA3772EA9}" dt="2019-03-26T00:43:20.080" v="2764" actId="14100"/>
+        <pc:spChg chg="add del mod">
+          <ac:chgData name="Nick Maxwell" userId="8614ede61265de7b" providerId="LiveId" clId="{E756AE67-FFAA-47C5-ABFC-9AFCA3772EA9}" dt="2019-03-29T15:20:22.782" v="2770"/>
           <ac:spMkLst>
             <pc:docMk/>
             <pc:sldMk cId="0" sldId="256"/>
@@ -290,16 +290,16 @@
             <ac:spMk id="29" creationId="{24414171-12C8-4AB6-927B-CB630EF0BE00}"/>
           </ac:spMkLst>
         </pc:spChg>
-        <pc:spChg chg="add mod">
-          <ac:chgData name="Nick Maxwell" userId="8614ede61265de7b" providerId="LiveId" clId="{E756AE67-FFAA-47C5-ABFC-9AFCA3772EA9}" dt="2019-03-26T00:29:30.957" v="2740" actId="1076"/>
+        <pc:spChg chg="add del mod">
+          <ac:chgData name="Nick Maxwell" userId="8614ede61265de7b" providerId="LiveId" clId="{E756AE67-FFAA-47C5-ABFC-9AFCA3772EA9}" dt="2019-03-29T15:20:36.913" v="2775" actId="478"/>
           <ac:spMkLst>
             <pc:docMk/>
             <pc:sldMk cId="0" sldId="256"/>
             <ac:spMk id="30" creationId="{FBB54662-E99C-4F4F-9862-C322D8A2E5FC}"/>
           </ac:spMkLst>
         </pc:spChg>
-        <pc:spChg chg="add mod">
-          <ac:chgData name="Nick Maxwell" userId="8614ede61265de7b" providerId="LiveId" clId="{E756AE67-FFAA-47C5-ABFC-9AFCA3772EA9}" dt="2019-03-26T00:29:39.641" v="2742" actId="1076"/>
+        <pc:spChg chg="add del mod">
+          <ac:chgData name="Nick Maxwell" userId="8614ede61265de7b" providerId="LiveId" clId="{E756AE67-FFAA-47C5-ABFC-9AFCA3772EA9}" dt="2019-03-29T15:20:22.782" v="2768"/>
           <ac:spMkLst>
             <pc:docMk/>
             <pc:sldMk cId="0" sldId="256"/>
@@ -572,7 +572,7 @@
             <a:fld id="{7B6456AB-DFE2-448E-B519-C03176FC0D7E}" type="datetimeFigureOut">
               <a:rPr lang="en-US" smtClean="0"/>
               <a:pPr/>
-              <a:t>3/25/2019</a:t>
+              <a:t>3/29/2019</a:t>
             </a:fld>
             <a:endParaRPr lang="en-US"/>
           </a:p>
@@ -737,7 +737,7 @@
             <a:fld id="{7B6456AB-DFE2-448E-B519-C03176FC0D7E}" type="datetimeFigureOut">
               <a:rPr lang="en-US" smtClean="0"/>
               <a:pPr/>
-              <a:t>3/25/2019</a:t>
+              <a:t>3/29/2019</a:t>
             </a:fld>
             <a:endParaRPr lang="en-US"/>
           </a:p>
@@ -912,7 +912,7 @@
             <a:fld id="{7B6456AB-DFE2-448E-B519-C03176FC0D7E}" type="datetimeFigureOut">
               <a:rPr lang="en-US" smtClean="0"/>
               <a:pPr/>
-              <a:t>3/25/2019</a:t>
+              <a:t>3/29/2019</a:t>
             </a:fld>
             <a:endParaRPr lang="en-US"/>
           </a:p>
@@ -1077,7 +1077,7 @@
             <a:fld id="{7B6456AB-DFE2-448E-B519-C03176FC0D7E}" type="datetimeFigureOut">
               <a:rPr lang="en-US" smtClean="0"/>
               <a:pPr/>
-              <a:t>3/25/2019</a:t>
+              <a:t>3/29/2019</a:t>
             </a:fld>
             <a:endParaRPr lang="en-US"/>
           </a:p>
@@ -1319,7 +1319,7 @@
             <a:fld id="{7B6456AB-DFE2-448E-B519-C03176FC0D7E}" type="datetimeFigureOut">
               <a:rPr lang="en-US" smtClean="0"/>
               <a:pPr/>
-              <a:t>3/25/2019</a:t>
+              <a:t>3/29/2019</a:t>
             </a:fld>
             <a:endParaRPr lang="en-US"/>
           </a:p>
@@ -1601,7 +1601,7 @@
             <a:fld id="{7B6456AB-DFE2-448E-B519-C03176FC0D7E}" type="datetimeFigureOut">
               <a:rPr lang="en-US" smtClean="0"/>
               <a:pPr/>
-              <a:t>3/25/2019</a:t>
+              <a:t>3/29/2019</a:t>
             </a:fld>
             <a:endParaRPr lang="en-US"/>
           </a:p>
@@ -2017,7 +2017,7 @@
             <a:fld id="{7B6456AB-DFE2-448E-B519-C03176FC0D7E}" type="datetimeFigureOut">
               <a:rPr lang="en-US" smtClean="0"/>
               <a:pPr/>
-              <a:t>3/25/2019</a:t>
+              <a:t>3/29/2019</a:t>
             </a:fld>
             <a:endParaRPr lang="en-US"/>
           </a:p>
@@ -2131,7 +2131,7 @@
             <a:fld id="{7B6456AB-DFE2-448E-B519-C03176FC0D7E}" type="datetimeFigureOut">
               <a:rPr lang="en-US" smtClean="0"/>
               <a:pPr/>
-              <a:t>3/25/2019</a:t>
+              <a:t>3/29/2019</a:t>
             </a:fld>
             <a:endParaRPr lang="en-US"/>
           </a:p>
@@ -2223,7 +2223,7 @@
             <a:fld id="{7B6456AB-DFE2-448E-B519-C03176FC0D7E}" type="datetimeFigureOut">
               <a:rPr lang="en-US" smtClean="0"/>
               <a:pPr/>
-              <a:t>3/25/2019</a:t>
+              <a:t>3/29/2019</a:t>
             </a:fld>
             <a:endParaRPr lang="en-US"/>
           </a:p>
@@ -2495,7 +2495,7 @@
             <a:fld id="{7B6456AB-DFE2-448E-B519-C03176FC0D7E}" type="datetimeFigureOut">
               <a:rPr lang="en-US" smtClean="0"/>
               <a:pPr/>
-              <a:t>3/25/2019</a:t>
+              <a:t>3/29/2019</a:t>
             </a:fld>
             <a:endParaRPr lang="en-US"/>
           </a:p>
@@ -2744,7 +2744,7 @@
             <a:fld id="{7B6456AB-DFE2-448E-B519-C03176FC0D7E}" type="datetimeFigureOut">
               <a:rPr lang="en-US" smtClean="0"/>
               <a:pPr/>
-              <a:t>3/25/2019</a:t>
+              <a:t>3/29/2019</a:t>
             </a:fld>
             <a:endParaRPr lang="en-US"/>
           </a:p>
@@ -2952,7 +2952,7 @@
             <a:fld id="{7B6456AB-DFE2-448E-B519-C03176FC0D7E}" type="datetimeFigureOut">
               <a:rPr lang="en-US" smtClean="0"/>
               <a:pPr/>
-              <a:t>3/25/2019</a:t>
+              <a:t>3/29/2019</a:t>
             </a:fld>
             <a:endParaRPr lang="en-US"/>
           </a:p>
@@ -3421,7 +3421,7 @@
         </p:nvSpPr>
         <p:spPr bwMode="auto">
           <a:xfrm>
-            <a:off x="13597995" y="24875604"/>
+            <a:off x="13597996" y="23114000"/>
             <a:ext cx="11647752" cy="1600200"/>
           </a:xfrm>
           <a:prstGeom prst="rect">
@@ -4096,11 +4096,7 @@
           </a:bodyPr>
           <a:lstStyle/>
           <a:p>
-            <a:pPr algn="ctr"/>
-            <a:r>
-              <a:rPr lang="en-US" sz="3200" b="1" dirty="0"/>
-              <a:t>Experiment 1</a:t>
-            </a:r>
+            <a:endParaRPr lang="en-US" sz="3200" b="1" i="1" dirty="0"/>
           </a:p>
           <a:p>
             <a:r>
@@ -4140,79 +4136,6 @@
             <a:r>
               <a:rPr lang="en-US" sz="3200" dirty="0"/>
               <a:t>Participants completed four sets of trials. The first two blocks always contained pure trials in which subjects either completed the CV or OE task. The final two blocks were switch blocks in which subjects completed both tasks, either in an alternating runs sequence (e.g., CV, CV, OE, OE, CV, CV) or in a randomized sequence (e.g., CV, OE, OE, OE, CV, OE). Each pure block contained 96 trials, while each switch block contained 120 trials. </a:t>
-            </a:r>
-            <a:endParaRPr lang="en-US" sz="3200" b="1" i="1" dirty="0"/>
-          </a:p>
-        </p:txBody>
-      </p:sp>
-      <p:sp>
-        <p:nvSpPr>
-          <p:cNvPr id="26" name="Text Box 3506">
-            <a:extLst>
-              <a:ext uri="{FF2B5EF4-FFF2-40B4-BE49-F238E27FC236}">
-                <a16:creationId xmlns:a16="http://schemas.microsoft.com/office/drawing/2014/main" id="{31688B2E-0C83-4880-B20B-350181D36961}"/>
-              </a:ext>
-            </a:extLst>
-          </p:cNvPr>
-          <p:cNvSpPr txBox="1">
-            <a:spLocks noChangeArrowheads="1"/>
-          </p:cNvSpPr>
-          <p:nvPr/>
-        </p:nvSpPr>
-        <p:spPr bwMode="auto">
-          <a:xfrm>
-            <a:off x="13710511" y="19280181"/>
-            <a:ext cx="11647752" cy="5126362"/>
-          </a:xfrm>
-          <a:prstGeom prst="rect">
-            <a:avLst/>
-          </a:prstGeom>
-          <a:noFill/>
-          <a:ln w="9525" algn="ctr">
-            <a:noFill/>
-            <a:miter lim="800000"/>
-            <a:headEnd/>
-            <a:tailEnd/>
-          </a:ln>
-          <a:effectLst/>
-        </p:spPr>
-        <p:txBody>
-          <a:bodyPr wrap="square" lIns="199977" tIns="99992" rIns="199977" bIns="99992">
-            <a:spAutoFit/>
-          </a:bodyPr>
-          <a:lstStyle/>
-          <a:p>
-            <a:pPr algn="ctr"/>
-            <a:r>
-              <a:rPr lang="en-US" sz="3200" b="1" dirty="0"/>
-              <a:t>Experiment 2</a:t>
-            </a:r>
-          </a:p>
-          <a:p>
-            <a:r>
-              <a:rPr lang="en-US" sz="3200" b="1" i="1" dirty="0"/>
-              <a:t>Participants</a:t>
-            </a:r>
-            <a:r>
-              <a:rPr lang="en-US" sz="3200" b="1" dirty="0"/>
-              <a:t> </a:t>
-            </a:r>
-            <a:r>
-              <a:rPr lang="en-US" sz="3200" dirty="0"/>
-              <a:t>XX adults were recruited from The Hattiesburg Clinic Memory Center. Subjects were classified as being either healthy older adults or as being diagnosed with Alzheimer’s. Patients with an Alzheimer’s diagnosis were classified as CDR 0 on the XX scale, meaning… [CITE]. Overall, XX subjects were classified as healthy and XX were classified as having Alzheimer's.</a:t>
-            </a:r>
-          </a:p>
-          <a:p>
-            <a:endParaRPr lang="en-US" sz="3200" dirty="0"/>
-          </a:p>
-          <a:p>
-            <a:r>
-              <a:rPr lang="en-US" sz="3200" b="1" i="1" dirty="0"/>
-              <a:t>Material and Procedure </a:t>
-            </a:r>
-            <a:r>
-              <a:rPr lang="en-US" sz="3200" dirty="0"/>
-              <a:t>The same stimuli and general procedure from Experiment 1 was used in Experiment 2.</a:t>
             </a:r>
             <a:endParaRPr lang="en-US" sz="3200" b="1" i="1" dirty="0"/>
           </a:p>
@@ -4312,102 +4235,6 @@
           </a:p>
           <a:p>
             <a:endParaRPr lang="en-US" sz="3200" dirty="0"/>
-          </a:p>
-        </p:txBody>
-      </p:sp>
-      <p:sp>
-        <p:nvSpPr>
-          <p:cNvPr id="30" name="Text Box 3506">
-            <a:extLst>
-              <a:ext uri="{FF2B5EF4-FFF2-40B4-BE49-F238E27FC236}">
-                <a16:creationId xmlns:a16="http://schemas.microsoft.com/office/drawing/2014/main" id="{FBB54662-E99C-4F4F-9862-C322D8A2E5FC}"/>
-              </a:ext>
-            </a:extLst>
-          </p:cNvPr>
-          <p:cNvSpPr txBox="1">
-            <a:spLocks noChangeArrowheads="1"/>
-          </p:cNvSpPr>
-          <p:nvPr/>
-        </p:nvSpPr>
-        <p:spPr bwMode="auto">
-          <a:xfrm>
-            <a:off x="13386879" y="26760862"/>
-            <a:ext cx="11647752" cy="1186822"/>
-          </a:xfrm>
-          <a:prstGeom prst="rect">
-            <a:avLst/>
-          </a:prstGeom>
-          <a:noFill/>
-          <a:ln w="9525" algn="ctr">
-            <a:noFill/>
-            <a:miter lim="800000"/>
-            <a:headEnd/>
-            <a:tailEnd/>
-          </a:ln>
-          <a:effectLst/>
-        </p:spPr>
-        <p:txBody>
-          <a:bodyPr wrap="square" lIns="199977" tIns="99992" rIns="199977" bIns="99992">
-            <a:spAutoFit/>
-          </a:bodyPr>
-          <a:lstStyle/>
-          <a:p>
-            <a:pPr algn="ctr"/>
-            <a:r>
-              <a:rPr lang="en-US" sz="3200" b="1" dirty="0"/>
-              <a:t>Experiment 1</a:t>
-            </a:r>
-          </a:p>
-          <a:p>
-            <a:endParaRPr lang="en-US" sz="3200" b="1" i="1" dirty="0"/>
-          </a:p>
-        </p:txBody>
-      </p:sp>
-      <p:sp>
-        <p:nvSpPr>
-          <p:cNvPr id="32" name="Text Box 3506">
-            <a:extLst>
-              <a:ext uri="{FF2B5EF4-FFF2-40B4-BE49-F238E27FC236}">
-                <a16:creationId xmlns:a16="http://schemas.microsoft.com/office/drawing/2014/main" id="{1D7945D4-261F-45C9-812D-C57B5A0B15A5}"/>
-              </a:ext>
-            </a:extLst>
-          </p:cNvPr>
-          <p:cNvSpPr txBox="1">
-            <a:spLocks noChangeArrowheads="1"/>
-          </p:cNvSpPr>
-          <p:nvPr/>
-        </p:nvSpPr>
-        <p:spPr bwMode="auto">
-          <a:xfrm>
-            <a:off x="13597995" y="31724375"/>
-            <a:ext cx="11647752" cy="1186822"/>
-          </a:xfrm>
-          <a:prstGeom prst="rect">
-            <a:avLst/>
-          </a:prstGeom>
-          <a:noFill/>
-          <a:ln w="9525" algn="ctr">
-            <a:noFill/>
-            <a:miter lim="800000"/>
-            <a:headEnd/>
-            <a:tailEnd/>
-          </a:ln>
-          <a:effectLst/>
-        </p:spPr>
-        <p:txBody>
-          <a:bodyPr wrap="square" lIns="199977" tIns="99992" rIns="199977" bIns="99992">
-            <a:spAutoFit/>
-          </a:bodyPr>
-          <a:lstStyle/>
-          <a:p>
-            <a:pPr algn="ctr"/>
-            <a:r>
-              <a:rPr lang="en-US" sz="3200" b="1" dirty="0"/>
-              <a:t>Experiment 2</a:t>
-            </a:r>
-          </a:p>
-          <a:p>
-            <a:endParaRPr lang="en-US" sz="3200" b="1" i="1" dirty="0"/>
           </a:p>
         </p:txBody>
       </p:sp>

</xml_diff>